<commit_message>
Changing from pptx from 2021 to 2022
</commit_message>
<xml_diff>
--- a/Project Object Recognition/2022 Camp Rock Paper Scissors/Templates/NN team project presentation template for students.pptx
+++ b/Project Object Recognition/2022 Camp Rock Paper Scissors/Templates/NN team project presentation template for students.pptx
@@ -28,14 +28,14 @@
       <p:boldItalic r:id="rId9"/>
     </p:embeddedFont>
     <p:embeddedFont>
-      <p:font typeface="Wells Fargo Sans" panose="020B0503020203020204" pitchFamily="34" charset="0"/>
+      <p:font typeface="Wells Fargo Sans" panose="020B0503020203020204"/>
       <p:regular r:id="rId9"/>
       <p:bold r:id="rId9"/>
       <p:italic r:id="rId9"/>
       <p:boldItalic r:id="rId9"/>
     </p:embeddedFont>
     <p:embeddedFont>
-      <p:font typeface="Wells Fargo Sans Display" panose="020B0503020203020204" pitchFamily="34" charset="0"/>
+      <p:font typeface="Wells Fargo Sans Display" panose="020F0702030404030204" pitchFamily="34" charset="0"/>
       <p:regular r:id="rId9"/>
       <p:bold r:id="rId10"/>
       <p:italic r:id="rId11"/>
@@ -243,7 +243,7 @@
           <a:p>
             <a:fld id="{601A3B40-5DCF-4258-96D0-70E04B8F9A4E}" type="datetimeFigureOut">
               <a:rPr lang="en-US" smtClean="0"/>
-              <a:t>6/5/21</a:t>
+              <a:t>8/10/22</a:t>
             </a:fld>
             <a:endParaRPr lang="en-US"/>
           </a:p>
@@ -408,7 +408,7 @@
           <a:p>
             <a:fld id="{6BE31B60-9600-4716-A2FD-EB59D46AC6B1}" type="datetimeFigureOut">
               <a:rPr lang="en-US" smtClean="0"/>
-              <a:t>6/5/21</a:t>
+              <a:t>8/10/22</a:t>
             </a:fld>
             <a:endParaRPr lang="en-US"/>
           </a:p>
@@ -1152,7 +1152,7 @@
           <a:p>
             <a:r>
               <a:rPr lang="en-US" sz="1800" dirty="0"/>
-              <a:t>2021</a:t>
+              <a:t>2022</a:t>
             </a:r>
             <a:r>
               <a:rPr lang="en-US" sz="1800" baseline="0" dirty="0"/>
@@ -1184,7 +1184,7 @@
       </p:transition>
     </mc:Fallback>
   </mc:AlternateContent>
-  <p:extLst mod="1">
+  <p:extLst>
     <p:ext uri="{DCECCB84-F9BA-43D5-87BE-67443E8EF086}">
       <p15:sldGuideLst xmlns:p15="http://schemas.microsoft.com/office/powerpoint/2012/main"/>
     </p:ext>
@@ -1431,7 +1431,7 @@
       </p:transition>
     </mc:Fallback>
   </mc:AlternateContent>
-  <p:extLst mod="1">
+  <p:extLst>
     <p:ext uri="{DCECCB84-F9BA-43D5-87BE-67443E8EF086}">
       <p15:sldGuideLst xmlns:p15="http://schemas.microsoft.com/office/powerpoint/2012/main"/>
     </p:ext>
@@ -4177,7 +4177,7 @@
       </p:transition>
     </mc:Fallback>
   </mc:AlternateContent>
-  <p:extLst mod="1">
+  <p:extLst>
     <p:ext uri="{DCECCB84-F9BA-43D5-87BE-67443E8EF086}">
       <p15:sldGuideLst xmlns:p15="http://schemas.microsoft.com/office/powerpoint/2012/main"/>
     </p:ext>
@@ -4729,7 +4729,7 @@
       </p:transition>
     </mc:Fallback>
   </mc:AlternateContent>
-  <p:extLst mod="1">
+  <p:extLst>
     <p:ext uri="{DCECCB84-F9BA-43D5-87BE-67443E8EF086}">
       <p15:sldGuideLst xmlns:p15="http://schemas.microsoft.com/office/powerpoint/2012/main"/>
     </p:ext>
@@ -5048,7 +5048,7 @@
       </p:transition>
     </mc:Fallback>
   </mc:AlternateContent>
-  <p:extLst mod="1">
+  <p:extLst>
     <p:ext uri="{DCECCB84-F9BA-43D5-87BE-67443E8EF086}">
       <p15:sldGuideLst xmlns:p15="http://schemas.microsoft.com/office/powerpoint/2012/main"/>
     </p:ext>
@@ -5219,7 +5219,7 @@
       </p:transition>
     </mc:Fallback>
   </mc:AlternateContent>
-  <p:extLst mod="1">
+  <p:extLst>
     <p:ext uri="{DCECCB84-F9BA-43D5-87BE-67443E8EF086}">
       <p15:sldGuideLst xmlns:p15="http://schemas.microsoft.com/office/powerpoint/2012/main"/>
     </p:ext>
@@ -5488,7 +5488,7 @@
       </p:transition>
     </mc:Fallback>
   </mc:AlternateContent>
-  <p:extLst mod="1">
+  <p:extLst>
     <p:ext uri="{DCECCB84-F9BA-43D5-87BE-67443E8EF086}">
       <p15:sldGuideLst xmlns:p15="http://schemas.microsoft.com/office/powerpoint/2012/main"/>
     </p:ext>
@@ -5735,7 +5735,7 @@
       </p:transition>
     </mc:Fallback>
   </mc:AlternateContent>
-  <p:extLst mod="1">
+  <p:extLst>
     <p:ext uri="{DCECCB84-F9BA-43D5-87BE-67443E8EF086}">
       <p15:sldGuideLst xmlns:p15="http://schemas.microsoft.com/office/powerpoint/2012/main"/>
     </p:ext>
@@ -6045,7 +6045,7 @@
       </p:transition>
     </mc:Fallback>
   </mc:AlternateContent>
-  <p:extLst mod="1">
+  <p:extLst>
     <p:ext uri="{DCECCB84-F9BA-43D5-87BE-67443E8EF086}">
       <p15:sldGuideLst xmlns:p15="http://schemas.microsoft.com/office/powerpoint/2012/main"/>
     </p:ext>
@@ -6292,7 +6292,7 @@
       </p:transition>
     </mc:Fallback>
   </mc:AlternateContent>
-  <p:extLst mod="1">
+  <p:extLst>
     <p:ext uri="{DCECCB84-F9BA-43D5-87BE-67443E8EF086}">
       <p15:sldGuideLst xmlns:p15="http://schemas.microsoft.com/office/powerpoint/2012/main"/>
     </p:ext>
@@ -6851,7 +6851,7 @@
       </a:lvl9pPr>
     </p:otherStyle>
   </p:txStyles>
-  <p:extLst mod="1">
+  <p:extLst>
     <p:ext uri="{27BBF7A9-308A-43DC-89C8-2F10F3537804}">
       <p15:sldGuideLst xmlns:p15="http://schemas.microsoft.com/office/powerpoint/2012/main">
         <p15:guide id="1" orient="horz" pos="288">

</xml_diff>